<commit_message>
post lecture clean up
</commit_message>
<xml_diff>
--- a/docs/Python_Tutorials_Schedule.pptx
+++ b/docs/Python_Tutorials_Schedule.pptx
@@ -4029,15 +4029,7 @@
             <a:pPr algn="ctr"/>
             <a:r>
               <a:rPr lang="en-US" sz="1400" dirty="0"/>
-              <a:t> (if, </a:t>
-            </a:r>
-            <a:r>
-              <a:rPr lang="en-US" sz="1400" dirty="0" err="1"/>
-              <a:t>elif</a:t>
-            </a:r>
-            <a:r>
-              <a:rPr lang="en-US" sz="1400" dirty="0"/>
-              <a:t>, else)</a:t>
+              <a:t> (if, elif, else)</a:t>
             </a:r>
           </a:p>
         </p:txBody>
@@ -4508,7 +4500,7 @@
         </p:nvSpPr>
         <p:spPr>
           <a:xfrm>
-            <a:off x="303342" y="4350676"/>
+            <a:off x="441819" y="3966708"/>
             <a:ext cx="1438162" cy="291660"/>
           </a:xfrm>
           <a:prstGeom prst="roundRect">
@@ -4557,7 +4549,7 @@
         </p:nvSpPr>
         <p:spPr>
           <a:xfrm>
-            <a:off x="309057" y="4675937"/>
+            <a:off x="447534" y="4291969"/>
             <a:ext cx="1438162" cy="291659"/>
           </a:xfrm>
           <a:prstGeom prst="roundRect">
@@ -4611,7 +4603,7 @@
         </p:nvSpPr>
         <p:spPr>
           <a:xfrm>
-            <a:off x="303342" y="5011196"/>
+            <a:off x="441819" y="4627228"/>
             <a:ext cx="1438162" cy="291659"/>
           </a:xfrm>
           <a:prstGeom prst="roundRect">
@@ -4665,7 +4657,7 @@
         </p:nvSpPr>
         <p:spPr>
           <a:xfrm>
-            <a:off x="303342" y="5346455"/>
+            <a:off x="441819" y="4962487"/>
             <a:ext cx="1438162" cy="291659"/>
           </a:xfrm>
           <a:prstGeom prst="roundRect">
@@ -4717,7 +4709,7 @@
         </p:nvSpPr>
         <p:spPr>
           <a:xfrm>
-            <a:off x="303342" y="5681714"/>
+            <a:off x="441819" y="5297746"/>
             <a:ext cx="1438162" cy="291659"/>
           </a:xfrm>
           <a:prstGeom prst="roundRect">
@@ -4839,11 +4831,10 @@
           <a:prstGeom prst="roundRect">
             <a:avLst/>
           </a:prstGeom>
-          <a:solidFill>
-            <a:schemeClr val="bg1">
-              <a:lumMod val="75000"/>
-            </a:schemeClr>
-          </a:solidFill>
+          <a:blipFill>
+            <a:blip r:embed="rId2"/>
+            <a:tile tx="0" ty="0" sx="100000" sy="100000" flip="none" algn="tl"/>
+          </a:blipFill>
           <a:ln>
             <a:noFill/>
           </a:ln>
@@ -4870,7 +4861,11 @@
           <a:p>
             <a:pPr algn="ctr"/>
             <a:r>
-              <a:rPr lang="en-US" dirty="0"/>
+              <a:rPr lang="en-US" dirty="0">
+                <a:solidFill>
+                  <a:schemeClr val="tx1"/>
+                </a:solidFill>
+              </a:rPr>
               <a:t>JUPYTER NOTEBOOKS</a:t>
             </a:r>
           </a:p>
@@ -4951,7 +4946,7 @@
         </p:nvSpPr>
         <p:spPr>
           <a:xfrm>
-            <a:off x="303342" y="6034051"/>
+            <a:off x="441819" y="5650083"/>
             <a:ext cx="1438162" cy="291659"/>
           </a:xfrm>
           <a:prstGeom prst="roundRect">
@@ -4994,6 +4989,132 @@
                 </a:solidFill>
               </a:rPr>
               <a:t>Lecture #6</a:t>
+            </a:r>
+          </a:p>
+        </p:txBody>
+      </p:sp>
+      <p:sp>
+        <p:nvSpPr>
+          <p:cNvPr id="35" name="Rounded Rectangle 34">
+            <a:extLst>
+              <a:ext uri="{FF2B5EF4-FFF2-40B4-BE49-F238E27FC236}">
+                <a16:creationId xmlns:a16="http://schemas.microsoft.com/office/drawing/2014/main" id="{5DEA16CF-D761-DB43-B345-6FBA540D5157}"/>
+              </a:ext>
+            </a:extLst>
+          </p:cNvPr>
+          <p:cNvSpPr/>
+          <p:nvPr/>
+        </p:nvSpPr>
+        <p:spPr>
+          <a:xfrm>
+            <a:off x="2982833" y="5294484"/>
+            <a:ext cx="2033779" cy="678889"/>
+          </a:xfrm>
+          <a:prstGeom prst="roundRect">
+            <a:avLst/>
+          </a:prstGeom>
+          <a:solidFill>
+            <a:schemeClr val="bg1">
+              <a:lumMod val="75000"/>
+            </a:schemeClr>
+          </a:solidFill>
+          <a:ln>
+            <a:solidFill>
+              <a:schemeClr val="tx1"/>
+            </a:solidFill>
+          </a:ln>
+        </p:spPr>
+        <p:style>
+          <a:lnRef idx="2">
+            <a:schemeClr val="accent1">
+              <a:shade val="50000"/>
+            </a:schemeClr>
+          </a:lnRef>
+          <a:fillRef idx="1">
+            <a:schemeClr val="accent1"/>
+          </a:fillRef>
+          <a:effectRef idx="0">
+            <a:schemeClr val="accent1"/>
+          </a:effectRef>
+          <a:fontRef idx="minor">
+            <a:schemeClr val="lt1"/>
+          </a:fontRef>
+        </p:style>
+        <p:txBody>
+          <a:bodyPr rtlCol="0" anchor="ctr"/>
+          <a:lstStyle/>
+          <a:p>
+            <a:pPr algn="ctr"/>
+            <a:r>
+              <a:rPr lang="en-US" dirty="0">
+                <a:solidFill>
+                  <a:schemeClr val="tx1"/>
+                </a:solidFill>
+              </a:rPr>
+              <a:t>CLASSES</a:t>
+            </a:r>
+          </a:p>
+        </p:txBody>
+      </p:sp>
+      <p:sp>
+        <p:nvSpPr>
+          <p:cNvPr id="36" name="Rounded Rectangle 35">
+            <a:extLst>
+              <a:ext uri="{FF2B5EF4-FFF2-40B4-BE49-F238E27FC236}">
+                <a16:creationId xmlns:a16="http://schemas.microsoft.com/office/drawing/2014/main" id="{933E8447-45DD-BB48-A17E-5AD52B5B1F61}"/>
+              </a:ext>
+            </a:extLst>
+          </p:cNvPr>
+          <p:cNvSpPr/>
+          <p:nvPr/>
+        </p:nvSpPr>
+        <p:spPr>
+          <a:xfrm>
+            <a:off x="441819" y="5973373"/>
+            <a:ext cx="1438162" cy="291659"/>
+          </a:xfrm>
+          <a:prstGeom prst="roundRect">
+            <a:avLst/>
+          </a:prstGeom>
+          <a:solidFill>
+            <a:schemeClr val="bg1">
+              <a:lumMod val="75000"/>
+            </a:schemeClr>
+          </a:solidFill>
+          <a:ln>
+            <a:solidFill>
+              <a:schemeClr val="tx1"/>
+            </a:solidFill>
+          </a:ln>
+        </p:spPr>
+        <p:style>
+          <a:lnRef idx="2">
+            <a:schemeClr val="accent1">
+              <a:shade val="50000"/>
+            </a:schemeClr>
+          </a:lnRef>
+          <a:fillRef idx="1">
+            <a:schemeClr val="accent1"/>
+          </a:fillRef>
+          <a:effectRef idx="0">
+            <a:schemeClr val="accent1"/>
+          </a:effectRef>
+          <a:fontRef idx="minor">
+            <a:schemeClr val="lt1"/>
+          </a:fontRef>
+        </p:style>
+        <p:txBody>
+          <a:bodyPr rtlCol="0" anchor="ctr"/>
+          <a:lstStyle/>
+          <a:p>
+            <a:pPr algn="ctr"/>
+            <a:r>
+              <a:rPr lang="en-US" sz="1200" dirty="0">
+                <a:solidFill>
+                  <a:schemeClr val="tx1"/>
+                </a:solidFill>
+              </a:rPr>
+              <a:t>Lecture #7</a:t>
             </a:r>
           </a:p>
         </p:txBody>

</xml_diff>